<commit_message>
refactor navigation menu in index.html to improve structure and add dropdowns
</commit_message>
<xml_diff>
--- a/Webflow_draft.pptx
+++ b/Webflow_draft.pptx
@@ -104,6 +104,11 @@
       </a:defRPr>
     </a:lvl9pPr>
   </p:defaultTextStyle>
+  <p:extLst>
+    <p:ext uri="{EFAFB233-063F-42B5-8137-9DF3F51BA10A}">
+      <p15:sldGuideLst xmlns:p15="http://schemas.microsoft.com/office/powerpoint/2012/main"/>
+    </p:ext>
+  </p:extLst>
 </p:presentation>
 </file>
 
@@ -254,7 +259,7 @@
           <a:p>
             <a:fld id="{6E1749A7-459A-423C-8CC1-3782A671225B}" type="datetimeFigureOut">
               <a:rPr lang="en-US" smtClean="0"/>
-              <a:t>3/6/2025</a:t>
+              <a:t>3/9/2025</a:t>
             </a:fld>
             <a:endParaRPr lang="en-US"/>
           </a:p>
@@ -452,7 +457,7 @@
           <a:p>
             <a:fld id="{6E1749A7-459A-423C-8CC1-3782A671225B}" type="datetimeFigureOut">
               <a:rPr lang="en-US" smtClean="0"/>
-              <a:t>3/6/2025</a:t>
+              <a:t>3/9/2025</a:t>
             </a:fld>
             <a:endParaRPr lang="en-US"/>
           </a:p>
@@ -660,7 +665,7 @@
           <a:p>
             <a:fld id="{6E1749A7-459A-423C-8CC1-3782A671225B}" type="datetimeFigureOut">
               <a:rPr lang="en-US" smtClean="0"/>
-              <a:t>3/6/2025</a:t>
+              <a:t>3/9/2025</a:t>
             </a:fld>
             <a:endParaRPr lang="en-US"/>
           </a:p>
@@ -858,7 +863,7 @@
           <a:p>
             <a:fld id="{6E1749A7-459A-423C-8CC1-3782A671225B}" type="datetimeFigureOut">
               <a:rPr lang="en-US" smtClean="0"/>
-              <a:t>3/6/2025</a:t>
+              <a:t>3/9/2025</a:t>
             </a:fld>
             <a:endParaRPr lang="en-US"/>
           </a:p>
@@ -1133,7 +1138,7 @@
           <a:p>
             <a:fld id="{6E1749A7-459A-423C-8CC1-3782A671225B}" type="datetimeFigureOut">
               <a:rPr lang="en-US" smtClean="0"/>
-              <a:t>3/6/2025</a:t>
+              <a:t>3/9/2025</a:t>
             </a:fld>
             <a:endParaRPr lang="en-US"/>
           </a:p>
@@ -1398,7 +1403,7 @@
           <a:p>
             <a:fld id="{6E1749A7-459A-423C-8CC1-3782A671225B}" type="datetimeFigureOut">
               <a:rPr lang="en-US" smtClean="0"/>
-              <a:t>3/6/2025</a:t>
+              <a:t>3/9/2025</a:t>
             </a:fld>
             <a:endParaRPr lang="en-US"/>
           </a:p>
@@ -1810,7 +1815,7 @@
           <a:p>
             <a:fld id="{6E1749A7-459A-423C-8CC1-3782A671225B}" type="datetimeFigureOut">
               <a:rPr lang="en-US" smtClean="0"/>
-              <a:t>3/6/2025</a:t>
+              <a:t>3/9/2025</a:t>
             </a:fld>
             <a:endParaRPr lang="en-US"/>
           </a:p>
@@ -1951,7 +1956,7 @@
           <a:p>
             <a:fld id="{6E1749A7-459A-423C-8CC1-3782A671225B}" type="datetimeFigureOut">
               <a:rPr lang="en-US" smtClean="0"/>
-              <a:t>3/6/2025</a:t>
+              <a:t>3/9/2025</a:t>
             </a:fld>
             <a:endParaRPr lang="en-US"/>
           </a:p>
@@ -2064,7 +2069,7 @@
           <a:p>
             <a:fld id="{6E1749A7-459A-423C-8CC1-3782A671225B}" type="datetimeFigureOut">
               <a:rPr lang="en-US" smtClean="0"/>
-              <a:t>3/6/2025</a:t>
+              <a:t>3/9/2025</a:t>
             </a:fld>
             <a:endParaRPr lang="en-US"/>
           </a:p>
@@ -2375,7 +2380,7 @@
           <a:p>
             <a:fld id="{6E1749A7-459A-423C-8CC1-3782A671225B}" type="datetimeFigureOut">
               <a:rPr lang="en-US" smtClean="0"/>
-              <a:t>3/6/2025</a:t>
+              <a:t>3/9/2025</a:t>
             </a:fld>
             <a:endParaRPr lang="en-US"/>
           </a:p>
@@ -2663,7 +2668,7 @@
           <a:p>
             <a:fld id="{6E1749A7-459A-423C-8CC1-3782A671225B}" type="datetimeFigureOut">
               <a:rPr lang="en-US" smtClean="0"/>
-              <a:t>3/6/2025</a:t>
+              <a:t>3/9/2025</a:t>
             </a:fld>
             <a:endParaRPr lang="en-US"/>
           </a:p>
@@ -2904,7 +2909,7 @@
           <a:p>
             <a:fld id="{6E1749A7-459A-423C-8CC1-3782A671225B}" type="datetimeFigureOut">
               <a:rPr lang="en-US" smtClean="0"/>
-              <a:t>3/6/2025</a:t>
+              <a:t>3/9/2025</a:t>
             </a:fld>
             <a:endParaRPr lang="en-US"/>
           </a:p>
@@ -3378,7 +3383,7 @@
         </p:nvCxnSpPr>
         <p:spPr>
           <a:xfrm>
-            <a:off x="884903" y="1052054"/>
+            <a:off x="884903" y="938876"/>
             <a:ext cx="0" cy="4621161"/>
           </a:xfrm>
           <a:prstGeom prst="line">
@@ -3530,7 +3535,7 @@
         </p:nvCxnSpPr>
         <p:spPr>
           <a:xfrm>
-            <a:off x="3023427" y="1052054"/>
+            <a:off x="3023427" y="938876"/>
             <a:ext cx="0" cy="4621161"/>
           </a:xfrm>
           <a:prstGeom prst="line">
@@ -3566,7 +3571,7 @@
         </p:nvSpPr>
         <p:spPr>
           <a:xfrm>
-            <a:off x="3037782" y="1096301"/>
+            <a:off x="3037782" y="1052052"/>
             <a:ext cx="1002197" cy="523220"/>
           </a:xfrm>
           <a:prstGeom prst="rect">
@@ -3664,7 +3669,7 @@
         </p:nvCxnSpPr>
         <p:spPr>
           <a:xfrm>
-            <a:off x="4699826" y="1052054"/>
+            <a:off x="4699826" y="938876"/>
             <a:ext cx="0" cy="4621161"/>
           </a:xfrm>
           <a:prstGeom prst="line">
@@ -3700,7 +3705,7 @@
         </p:nvSpPr>
         <p:spPr>
           <a:xfrm>
-            <a:off x="4699820" y="1076634"/>
+            <a:off x="4699820" y="1052052"/>
             <a:ext cx="1695144" cy="1384995"/>
           </a:xfrm>
           <a:prstGeom prst="rect">
@@ -3843,7 +3848,7 @@
         </p:nvCxnSpPr>
         <p:spPr>
           <a:xfrm>
-            <a:off x="6700695" y="1052054"/>
+            <a:off x="6700695" y="938876"/>
             <a:ext cx="0" cy="4621161"/>
           </a:xfrm>
           <a:prstGeom prst="line">
@@ -3921,7 +3926,7 @@
         </p:nvCxnSpPr>
         <p:spPr>
           <a:xfrm>
-            <a:off x="7944476" y="1052054"/>
+            <a:off x="7944476" y="938876"/>
             <a:ext cx="0" cy="4621161"/>
           </a:xfrm>
           <a:prstGeom prst="line">
@@ -3957,7 +3962,7 @@
         </p:nvSpPr>
         <p:spPr>
           <a:xfrm>
-            <a:off x="7948565" y="1076633"/>
+            <a:off x="7948565" y="1052052"/>
             <a:ext cx="1467646" cy="523220"/>
           </a:xfrm>
           <a:prstGeom prst="rect">
@@ -4052,7 +4057,7 @@
         </p:nvCxnSpPr>
         <p:spPr>
           <a:xfrm>
-            <a:off x="9640541" y="938877"/>
+            <a:off x="9640541" y="938876"/>
             <a:ext cx="0" cy="4621161"/>
           </a:xfrm>
           <a:prstGeom prst="line">

</xml_diff>